<commit_message>
Image 5 and workflow updated
Added a slice image to Fig 5 and increased the text size of work flow
</commit_message>
<xml_diff>
--- a/figure5.pptx
+++ b/figure5.pptx
@@ -5,10 +5,11 @@
     <p:sldMasterId id="2147483648" r:id="rId1"/>
   </p:sldMasterIdLst>
   <p:notesMasterIdLst>
-    <p:notesMasterId r:id="rId3"/>
+    <p:notesMasterId r:id="rId4"/>
   </p:notesMasterIdLst>
   <p:sldIdLst>
     <p:sldId id="256" r:id="rId2"/>
+    <p:sldId id="257" r:id="rId3"/>
   </p:sldIdLst>
   <p:sldSz cx="18380075" cy="12957175"/>
   <p:notesSz cx="6858000" cy="9144000"/>
@@ -107,6 +108,22 @@
       </a:defRPr>
     </a:lvl9pPr>
   </p:defaultTextStyle>
+  <p:extLst>
+    <p:ext uri="{EFAFB233-063F-42B5-8137-9DF3F51BA10A}">
+      <p15:sldGuideLst xmlns:p15="http://schemas.microsoft.com/office/powerpoint/2012/main">
+        <p15:guide id="1" orient="horz" pos="4081">
+          <p15:clr>
+            <a:srgbClr val="A4A3A4"/>
+          </p15:clr>
+        </p15:guide>
+        <p15:guide id="2" pos="5790">
+          <p15:clr>
+            <a:srgbClr val="A4A3A4"/>
+          </p15:clr>
+        </p15:guide>
+      </p15:sldGuideLst>
+    </p:ext>
+  </p:extLst>
 </p:presentation>
 </file>
 
@@ -3835,8 +3852,9 @@
             </a:solidFill>
             <a:ln w="76200">
               <a:solidFill>
-                <a:srgbClr val="00B050"/>
+                <a:schemeClr val="tx1"/>
               </a:solidFill>
+              <a:prstDash val="sysDash"/>
             </a:ln>
           </p:spPr>
           <p:style>
@@ -3967,58 +3985,6 @@
       </p:grpSp>
       <p:sp>
         <p:nvSpPr>
-          <p:cNvPr id="42" name="Flowchart: Preparation 41"/>
-          <p:cNvSpPr/>
-          <p:nvPr/>
-        </p:nvSpPr>
-        <p:spPr>
-          <a:xfrm rot="5400000" flipV="1">
-            <a:off x="3876280" y="6510393"/>
-            <a:ext cx="12750992" cy="142278"/>
-          </a:xfrm>
-          <a:prstGeom prst="flowChartPreparation">
-            <a:avLst/>
-          </a:prstGeom>
-          <a:solidFill>
-            <a:srgbClr val="238B45">
-              <a:alpha val="25000"/>
-            </a:srgbClr>
-          </a:solidFill>
-          <a:ln>
-            <a:solidFill>
-              <a:srgbClr val="238B45">
-                <a:alpha val="31000"/>
-              </a:srgbClr>
-            </a:solidFill>
-          </a:ln>
-        </p:spPr>
-        <p:style>
-          <a:lnRef idx="2">
-            <a:schemeClr val="accent1">
-              <a:shade val="50000"/>
-            </a:schemeClr>
-          </a:lnRef>
-          <a:fillRef idx="1">
-            <a:schemeClr val="accent1"/>
-          </a:fillRef>
-          <a:effectRef idx="0">
-            <a:schemeClr val="accent1"/>
-          </a:effectRef>
-          <a:fontRef idx="minor">
-            <a:schemeClr val="lt1"/>
-          </a:fontRef>
-        </p:style>
-        <p:txBody>
-          <a:bodyPr rtlCol="0" anchor="ctr"/>
-          <a:lstStyle/>
-          <a:p>
-            <a:pPr algn="ctr"/>
-            <a:endParaRPr lang="en-US"/>
-          </a:p>
-        </p:txBody>
-      </p:sp>
-      <p:sp>
-        <p:nvSpPr>
           <p:cNvPr id="43" name="Flowchart: Alternate Process 42"/>
           <p:cNvSpPr/>
           <p:nvPr/>
@@ -4250,10 +4216,1148 @@
           </a:p>
         </p:txBody>
       </p:sp>
+      <p:cxnSp>
+        <p:nvCxnSpPr>
+          <p:cNvPr id="3" name="Straight Connector 2"/>
+          <p:cNvCxnSpPr/>
+          <p:nvPr/>
+        </p:nvCxnSpPr>
+        <p:spPr>
+          <a:xfrm>
+            <a:off x="10104437" y="612020"/>
+            <a:ext cx="0" cy="11960434"/>
+          </a:xfrm>
+          <a:prstGeom prst="line">
+            <a:avLst/>
+          </a:prstGeom>
+          <a:ln w="142875" cap="rnd">
+            <a:solidFill>
+              <a:srgbClr val="238B45">
+                <a:alpha val="85000"/>
+              </a:srgbClr>
+            </a:solidFill>
+            <a:prstDash val="sysDot"/>
+          </a:ln>
+        </p:spPr>
+        <p:style>
+          <a:lnRef idx="1">
+            <a:schemeClr val="accent1"/>
+          </a:lnRef>
+          <a:fillRef idx="0">
+            <a:schemeClr val="accent1"/>
+          </a:fillRef>
+          <a:effectRef idx="0">
+            <a:schemeClr val="accent1"/>
+          </a:effectRef>
+          <a:fontRef idx="minor">
+            <a:schemeClr val="tx1"/>
+          </a:fontRef>
+        </p:style>
+      </p:cxnSp>
     </p:spTree>
     <p:extLst>
       <p:ext uri="{BB962C8B-B14F-4D97-AF65-F5344CB8AC3E}">
         <p14:creationId xmlns:p14="http://schemas.microsoft.com/office/powerpoint/2010/main" val="4126907988"/>
+      </p:ext>
+    </p:extLst>
+  </p:cSld>
+  <p:clrMapOvr>
+    <a:masterClrMapping/>
+  </p:clrMapOvr>
+  <p:timing>
+    <p:tnLst>
+      <p:par>
+        <p:cTn id="1" dur="indefinite" restart="never" nodeType="tmRoot"/>
+      </p:par>
+    </p:tnLst>
+  </p:timing>
+</p:sld>
+</file>
+
+<file path=ppt/slides/slide2.xml><?xml version="1.0" encoding="utf-8"?>
+<p:sld xmlns:a="http://schemas.openxmlformats.org/drawingml/2006/main" xmlns:r="http://schemas.openxmlformats.org/officeDocument/2006/relationships" xmlns:p="http://schemas.openxmlformats.org/presentationml/2006/main">
+  <p:cSld>
+    <p:spTree>
+      <p:nvGrpSpPr>
+        <p:cNvPr id="1" name=""/>
+        <p:cNvGrpSpPr/>
+        <p:nvPr/>
+      </p:nvGrpSpPr>
+      <p:grpSpPr>
+        <a:xfrm>
+          <a:off x="0" y="0"/>
+          <a:ext cx="0" cy="0"/>
+          <a:chOff x="0" y="0"/>
+          <a:chExt cx="0" cy="0"/>
+        </a:xfrm>
+      </p:grpSpPr>
+      <p:pic>
+        <p:nvPicPr>
+          <p:cNvPr id="26" name="Picture 25"/>
+          <p:cNvPicPr>
+            <a:picLocks noChangeAspect="1"/>
+          </p:cNvPicPr>
+          <p:nvPr/>
+        </p:nvPicPr>
+        <p:blipFill rotWithShape="1">
+          <a:blip r:embed="rId2">
+            <a:extLst>
+              <a:ext uri="{28A0092B-C50C-407E-A947-70E740481C1C}">
+                <a14:useLocalDpi xmlns:a14="http://schemas.microsoft.com/office/drawing/2010/main" val="0"/>
+              </a:ext>
+            </a:extLst>
+          </a:blip>
+          <a:srcRect l="6258" t="9563" r="9615" b="10106"/>
+          <a:stretch/>
+        </p:blipFill>
+        <p:spPr>
+          <a:xfrm>
+            <a:off x="61267" y="2649357"/>
+            <a:ext cx="6459720" cy="5898004"/>
+          </a:xfrm>
+          <a:prstGeom prst="rect">
+            <a:avLst/>
+          </a:prstGeom>
+        </p:spPr>
+      </p:pic>
+      <p:grpSp>
+        <p:nvGrpSpPr>
+          <p:cNvPr id="27" name="Group 26"/>
+          <p:cNvGrpSpPr/>
+          <p:nvPr/>
+        </p:nvGrpSpPr>
+        <p:grpSpPr>
+          <a:xfrm>
+            <a:off x="6430041" y="3105786"/>
+            <a:ext cx="3355243" cy="3482595"/>
+            <a:chOff x="10959160" y="4857564"/>
+            <a:chExt cx="2007058" cy="1909417"/>
+          </a:xfrm>
+        </p:grpSpPr>
+        <p:sp>
+          <p:nvSpPr>
+            <p:cNvPr id="28" name="Oval 27"/>
+            <p:cNvSpPr>
+              <a:spLocks noChangeAspect="1"/>
+            </p:cNvSpPr>
+            <p:nvPr/>
+          </p:nvSpPr>
+          <p:spPr>
+            <a:xfrm>
+              <a:off x="10959160" y="4885593"/>
+              <a:ext cx="1881055" cy="1881388"/>
+            </a:xfrm>
+            <a:prstGeom prst="ellipse">
+              <a:avLst/>
+            </a:prstGeom>
+            <a:noFill/>
+            <a:ln w="127000">
+              <a:solidFill>
+                <a:srgbClr val="00B050"/>
+              </a:solidFill>
+            </a:ln>
+          </p:spPr>
+          <p:style>
+            <a:lnRef idx="2">
+              <a:schemeClr val="accent1">
+                <a:shade val="50000"/>
+              </a:schemeClr>
+            </a:lnRef>
+            <a:fillRef idx="1">
+              <a:schemeClr val="accent1"/>
+            </a:fillRef>
+            <a:effectRef idx="0">
+              <a:schemeClr val="accent1"/>
+            </a:effectRef>
+            <a:fontRef idx="minor">
+              <a:schemeClr val="lt1"/>
+            </a:fontRef>
+          </p:style>
+          <p:txBody>
+            <a:bodyPr rtlCol="0" anchor="ctr"/>
+            <a:lstStyle/>
+            <a:p>
+              <a:pPr algn="ctr"/>
+              <a:endParaRPr lang="en-US"/>
+            </a:p>
+          </p:txBody>
+        </p:sp>
+        <p:pic>
+          <p:nvPicPr>
+            <p:cNvPr id="29" name="Picture 28"/>
+            <p:cNvPicPr>
+              <a:picLocks noChangeAspect="1"/>
+            </p:cNvPicPr>
+            <p:nvPr/>
+          </p:nvPicPr>
+          <p:blipFill>
+            <a:blip r:embed="rId3">
+              <a:extLst>
+                <a:ext uri="{28A0092B-C50C-407E-A947-70E740481C1C}">
+                  <a14:useLocalDpi xmlns:a14="http://schemas.microsoft.com/office/drawing/2010/main" val="0"/>
+                </a:ext>
+              </a:extLst>
+            </a:blip>
+            <a:stretch>
+              <a:fillRect/>
+            </a:stretch>
+          </p:blipFill>
+          <p:spPr>
+            <a:xfrm>
+              <a:off x="10959160" y="4857564"/>
+              <a:ext cx="2007058" cy="1909417"/>
+            </a:xfrm>
+            <a:prstGeom prst="rect">
+              <a:avLst/>
+            </a:prstGeom>
+          </p:spPr>
+        </p:pic>
+      </p:grpSp>
+      <p:grpSp>
+        <p:nvGrpSpPr>
+          <p:cNvPr id="30" name="Group 29"/>
+          <p:cNvGrpSpPr/>
+          <p:nvPr/>
+        </p:nvGrpSpPr>
+        <p:grpSpPr>
+          <a:xfrm>
+            <a:off x="10550038" y="11366659"/>
+            <a:ext cx="8074285" cy="1590516"/>
+            <a:chOff x="9275068" y="12692612"/>
+            <a:chExt cx="8933858" cy="1590516"/>
+          </a:xfrm>
+        </p:grpSpPr>
+        <p:pic>
+          <p:nvPicPr>
+            <p:cNvPr id="31" name="Picture 30"/>
+            <p:cNvPicPr>
+              <a:picLocks noChangeAspect="1"/>
+            </p:cNvPicPr>
+            <p:nvPr/>
+          </p:nvPicPr>
+          <p:blipFill rotWithShape="1">
+            <a:blip r:embed="rId4">
+              <a:extLst>
+                <a:ext uri="{28A0092B-C50C-407E-A947-70E740481C1C}">
+                  <a14:useLocalDpi xmlns:a14="http://schemas.microsoft.com/office/drawing/2010/main" val="0"/>
+                </a:ext>
+              </a:extLst>
+            </a:blip>
+            <a:srcRect l="22164" t="8371" r="54524" b="6163"/>
+            <a:stretch/>
+          </p:blipFill>
+          <p:spPr>
+            <a:xfrm rot="5400000">
+              <a:off x="12964278" y="9003402"/>
+              <a:ext cx="812367" cy="8190787"/>
+            </a:xfrm>
+            <a:prstGeom prst="rect">
+              <a:avLst/>
+            </a:prstGeom>
+          </p:spPr>
+        </p:pic>
+        <p:sp>
+          <p:nvSpPr>
+            <p:cNvPr id="32" name="TextBox 31"/>
+            <p:cNvSpPr txBox="1"/>
+            <p:nvPr/>
+          </p:nvSpPr>
+          <p:spPr>
+            <a:xfrm>
+              <a:off x="16722788" y="13513687"/>
+              <a:ext cx="1486138" cy="769441"/>
+            </a:xfrm>
+            <a:prstGeom prst="rect">
+              <a:avLst/>
+            </a:prstGeom>
+            <a:noFill/>
+          </p:spPr>
+          <p:txBody>
+            <a:bodyPr wrap="square" rtlCol="0">
+              <a:spAutoFit/>
+            </a:bodyPr>
+            <a:lstStyle/>
+            <a:p>
+              <a:pPr algn="ctr"/>
+              <a:r>
+                <a:rPr lang="en-US" sz="4400" b="1" dirty="0" smtClean="0"/>
+                <a:t>529</a:t>
+              </a:r>
+              <a:endParaRPr lang="en-US" sz="1600" b="1" dirty="0"/>
+            </a:p>
+          </p:txBody>
+        </p:sp>
+        <p:sp>
+          <p:nvSpPr>
+            <p:cNvPr id="33" name="TextBox 32"/>
+            <p:cNvSpPr txBox="1"/>
+            <p:nvPr/>
+          </p:nvSpPr>
+          <p:spPr>
+            <a:xfrm>
+              <a:off x="15028633" y="13513687"/>
+              <a:ext cx="1486138" cy="769441"/>
+            </a:xfrm>
+            <a:prstGeom prst="rect">
+              <a:avLst/>
+            </a:prstGeom>
+            <a:noFill/>
+          </p:spPr>
+          <p:txBody>
+            <a:bodyPr wrap="square" rtlCol="0">
+              <a:spAutoFit/>
+            </a:bodyPr>
+            <a:lstStyle/>
+            <a:p>
+              <a:r>
+                <a:rPr lang="en-US" sz="4400" b="1" dirty="0" smtClean="0"/>
+                <a:t>396</a:t>
+              </a:r>
+              <a:endParaRPr lang="en-US" sz="1600" b="1" dirty="0"/>
+            </a:p>
+          </p:txBody>
+        </p:sp>
+        <p:sp>
+          <p:nvSpPr>
+            <p:cNvPr id="34" name="TextBox 33"/>
+            <p:cNvSpPr txBox="1"/>
+            <p:nvPr/>
+          </p:nvSpPr>
+          <p:spPr>
+            <a:xfrm>
+              <a:off x="12912152" y="13513687"/>
+              <a:ext cx="1486138" cy="769441"/>
+            </a:xfrm>
+            <a:prstGeom prst="rect">
+              <a:avLst/>
+            </a:prstGeom>
+            <a:noFill/>
+          </p:spPr>
+          <p:txBody>
+            <a:bodyPr wrap="square" rtlCol="0">
+              <a:spAutoFit/>
+            </a:bodyPr>
+            <a:lstStyle/>
+            <a:p>
+              <a:r>
+                <a:rPr lang="en-US" sz="4400" b="1" dirty="0" smtClean="0"/>
+                <a:t>264</a:t>
+              </a:r>
+              <a:endParaRPr lang="en-US" sz="1600" b="1" dirty="0"/>
+            </a:p>
+          </p:txBody>
+        </p:sp>
+        <p:sp>
+          <p:nvSpPr>
+            <p:cNvPr id="35" name="TextBox 34"/>
+            <p:cNvSpPr txBox="1"/>
+            <p:nvPr/>
+          </p:nvSpPr>
+          <p:spPr>
+            <a:xfrm>
+              <a:off x="9564465" y="13513687"/>
+              <a:ext cx="1486138" cy="769441"/>
+            </a:xfrm>
+            <a:prstGeom prst="rect">
+              <a:avLst/>
+            </a:prstGeom>
+            <a:noFill/>
+          </p:spPr>
+          <p:txBody>
+            <a:bodyPr wrap="square" rtlCol="0">
+              <a:spAutoFit/>
+            </a:bodyPr>
+            <a:lstStyle/>
+            <a:p>
+              <a:r>
+                <a:rPr lang="en-US" sz="4400" b="1" dirty="0" smtClean="0"/>
+                <a:t>132</a:t>
+              </a:r>
+              <a:endParaRPr lang="en-US" sz="1600" b="1" dirty="0"/>
+            </a:p>
+          </p:txBody>
+        </p:sp>
+      </p:grpSp>
+      <p:pic>
+        <p:nvPicPr>
+          <p:cNvPr id="36" name="Picture 35"/>
+          <p:cNvPicPr>
+            <a:picLocks noChangeAspect="1"/>
+          </p:cNvPicPr>
+          <p:nvPr/>
+        </p:nvPicPr>
+        <p:blipFill>
+          <a:blip r:embed="rId5">
+            <a:extLst>
+              <a:ext uri="{28A0092B-C50C-407E-A947-70E740481C1C}">
+                <a14:useLocalDpi xmlns:a14="http://schemas.microsoft.com/office/drawing/2010/main" val="0"/>
+              </a:ext>
+            </a:extLst>
+          </a:blip>
+          <a:stretch>
+            <a:fillRect/>
+          </a:stretch>
+        </p:blipFill>
+        <p:spPr>
+          <a:xfrm>
+            <a:off x="11079544" y="2494160"/>
+            <a:ext cx="3624710" cy="3492980"/>
+          </a:xfrm>
+          <a:prstGeom prst="rect">
+            <a:avLst/>
+          </a:prstGeom>
+        </p:spPr>
+      </p:pic>
+      <p:grpSp>
+        <p:nvGrpSpPr>
+          <p:cNvPr id="37" name="Group 36"/>
+          <p:cNvGrpSpPr/>
+          <p:nvPr/>
+        </p:nvGrpSpPr>
+        <p:grpSpPr>
+          <a:xfrm>
+            <a:off x="10893492" y="2942783"/>
+            <a:ext cx="7197431" cy="8130670"/>
+            <a:chOff x="9995038" y="4753567"/>
+            <a:chExt cx="7197431" cy="8130670"/>
+          </a:xfrm>
+        </p:grpSpPr>
+        <p:pic>
+          <p:nvPicPr>
+            <p:cNvPr id="38" name="Picture 37"/>
+            <p:cNvPicPr>
+              <a:picLocks noChangeAspect="1"/>
+            </p:cNvPicPr>
+            <p:nvPr/>
+          </p:nvPicPr>
+          <p:blipFill rotWithShape="1">
+            <a:blip r:embed="rId6">
+              <a:extLst>
+                <a:ext uri="{28A0092B-C50C-407E-A947-70E740481C1C}">
+                  <a14:useLocalDpi xmlns:a14="http://schemas.microsoft.com/office/drawing/2010/main" val="0"/>
+                </a:ext>
+              </a:extLst>
+            </a:blip>
+            <a:srcRect l="3503" r="8567"/>
+            <a:stretch/>
+          </p:blipFill>
+          <p:spPr>
+            <a:xfrm>
+              <a:off x="9995038" y="5110199"/>
+              <a:ext cx="7197431" cy="7774038"/>
+            </a:xfrm>
+            <a:prstGeom prst="rect">
+              <a:avLst/>
+            </a:prstGeom>
+          </p:spPr>
+        </p:pic>
+        <p:sp>
+          <p:nvSpPr>
+            <p:cNvPr id="39" name="Oval 38"/>
+            <p:cNvSpPr/>
+            <p:nvPr/>
+          </p:nvSpPr>
+          <p:spPr>
+            <a:xfrm>
+              <a:off x="12015133" y="4753567"/>
+              <a:ext cx="834190" cy="832104"/>
+            </a:xfrm>
+            <a:prstGeom prst="ellipse">
+              <a:avLst/>
+            </a:prstGeom>
+            <a:solidFill>
+              <a:schemeClr val="bg1">
+                <a:alpha val="43000"/>
+              </a:schemeClr>
+            </a:solidFill>
+            <a:ln w="76200">
+              <a:solidFill>
+                <a:schemeClr val="tx1"/>
+              </a:solidFill>
+              <a:prstDash val="sysDash"/>
+            </a:ln>
+          </p:spPr>
+          <p:style>
+            <a:lnRef idx="2">
+              <a:schemeClr val="accent1">
+                <a:shade val="50000"/>
+              </a:schemeClr>
+            </a:lnRef>
+            <a:fillRef idx="1">
+              <a:schemeClr val="accent1"/>
+            </a:fillRef>
+            <a:effectRef idx="0">
+              <a:schemeClr val="accent1"/>
+            </a:effectRef>
+            <a:fontRef idx="minor">
+              <a:schemeClr val="lt1"/>
+            </a:fontRef>
+          </p:style>
+          <p:txBody>
+            <a:bodyPr rtlCol="0" anchor="ctr"/>
+            <a:lstStyle/>
+            <a:p>
+              <a:pPr algn="ctr"/>
+              <a:r>
+                <a:rPr lang="en-US" sz="4400" dirty="0">
+                  <a:ln w="0"/>
+                  <a:solidFill>
+                    <a:schemeClr val="tx1"/>
+                  </a:solidFill>
+                  <a:effectLst>
+                    <a:outerShdw blurRad="38100" dist="19050" dir="2700000" algn="tl" rotWithShape="0">
+                      <a:schemeClr val="dk1">
+                        <a:alpha val="40000"/>
+                      </a:schemeClr>
+                    </a:outerShdw>
+                  </a:effectLst>
+                </a:rPr>
+                <a:t>1</a:t>
+              </a:r>
+              <a:endParaRPr lang="en-US" dirty="0">
+                <a:ln w="0"/>
+                <a:solidFill>
+                  <a:schemeClr val="tx1"/>
+                </a:solidFill>
+                <a:effectLst>
+                  <a:outerShdw blurRad="38100" dist="19050" dir="2700000" algn="tl" rotWithShape="0">
+                    <a:schemeClr val="dk1">
+                      <a:alpha val="40000"/>
+                    </a:schemeClr>
+                  </a:outerShdw>
+                </a:effectLst>
+              </a:endParaRPr>
+            </a:p>
+          </p:txBody>
+        </p:sp>
+        <p:cxnSp>
+          <p:nvCxnSpPr>
+            <p:cNvPr id="40" name="Straight Connector 39"/>
+            <p:cNvCxnSpPr/>
+            <p:nvPr/>
+          </p:nvCxnSpPr>
+          <p:spPr>
+            <a:xfrm flipH="1">
+              <a:off x="10071238" y="6934200"/>
+              <a:ext cx="1125706" cy="3242640"/>
+            </a:xfrm>
+            <a:prstGeom prst="line">
+              <a:avLst/>
+            </a:prstGeom>
+            <a:ln w="50800">
+              <a:solidFill>
+                <a:srgbClr val="002060"/>
+              </a:solidFill>
+              <a:prstDash val="dash"/>
+            </a:ln>
+          </p:spPr>
+          <p:style>
+            <a:lnRef idx="1">
+              <a:schemeClr val="accent1"/>
+            </a:lnRef>
+            <a:fillRef idx="0">
+              <a:schemeClr val="accent1"/>
+            </a:fillRef>
+            <a:effectRef idx="0">
+              <a:schemeClr val="accent1"/>
+            </a:effectRef>
+            <a:fontRef idx="minor">
+              <a:schemeClr val="tx1"/>
+            </a:fontRef>
+          </p:style>
+        </p:cxnSp>
+        <p:cxnSp>
+          <p:nvCxnSpPr>
+            <p:cNvPr id="41" name="Straight Connector 40"/>
+            <p:cNvCxnSpPr/>
+            <p:nvPr/>
+          </p:nvCxnSpPr>
+          <p:spPr>
+            <a:xfrm>
+              <a:off x="13143620" y="5188346"/>
+              <a:ext cx="1846588" cy="279936"/>
+            </a:xfrm>
+            <a:prstGeom prst="line">
+              <a:avLst/>
+            </a:prstGeom>
+            <a:ln w="50800">
+              <a:solidFill>
+                <a:srgbClr val="002060"/>
+              </a:solidFill>
+              <a:prstDash val="dash"/>
+            </a:ln>
+          </p:spPr>
+          <p:style>
+            <a:lnRef idx="1">
+              <a:schemeClr val="accent1"/>
+            </a:lnRef>
+            <a:fillRef idx="0">
+              <a:schemeClr val="accent1"/>
+            </a:fillRef>
+            <a:effectRef idx="0">
+              <a:schemeClr val="accent1"/>
+            </a:effectRef>
+            <a:fontRef idx="minor">
+              <a:schemeClr val="tx1"/>
+            </a:fontRef>
+          </p:style>
+        </p:cxnSp>
+      </p:grpSp>
+      <p:sp>
+        <p:nvSpPr>
+          <p:cNvPr id="43" name="Flowchart: Alternate Process 42"/>
+          <p:cNvSpPr/>
+          <p:nvPr/>
+        </p:nvSpPr>
+        <p:spPr>
+          <a:xfrm>
+            <a:off x="743744" y="612020"/>
+            <a:ext cx="9144000" cy="1751768"/>
+          </a:xfrm>
+          <a:prstGeom prst="flowChartAlternateProcess">
+            <a:avLst/>
+          </a:prstGeom>
+          <a:solidFill>
+            <a:srgbClr val="66C2A4">
+              <a:alpha val="45000"/>
+            </a:srgbClr>
+          </a:solidFill>
+          <a:ln>
+            <a:noFill/>
+          </a:ln>
+        </p:spPr>
+        <p:style>
+          <a:lnRef idx="2">
+            <a:schemeClr val="accent1">
+              <a:shade val="50000"/>
+            </a:schemeClr>
+          </a:lnRef>
+          <a:fillRef idx="1">
+            <a:schemeClr val="accent1"/>
+          </a:fillRef>
+          <a:effectRef idx="0">
+            <a:schemeClr val="accent1"/>
+          </a:effectRef>
+          <a:fontRef idx="minor">
+            <a:schemeClr val="lt1"/>
+          </a:fontRef>
+        </p:style>
+        <p:txBody>
+          <a:bodyPr rtlCol="0" anchor="t"/>
+          <a:lstStyle/>
+          <a:p>
+            <a:pPr algn="ctr"/>
+            <a:r>
+              <a:rPr lang="en-US" sz="4800" dirty="0" smtClean="0">
+                <a:solidFill>
+                  <a:srgbClr val="238B45"/>
+                </a:solidFill>
+              </a:rPr>
+              <a:t>MetaTracts color mapped to the major axis directions</a:t>
+            </a:r>
+            <a:endParaRPr lang="en-US" sz="4800" dirty="0">
+              <a:solidFill>
+                <a:srgbClr val="238B45"/>
+              </a:solidFill>
+            </a:endParaRPr>
+          </a:p>
+        </p:txBody>
+      </p:sp>
+      <p:sp>
+        <p:nvSpPr>
+          <p:cNvPr id="44" name="Flowchart: Alternate Process 43"/>
+          <p:cNvSpPr/>
+          <p:nvPr/>
+        </p:nvSpPr>
+        <p:spPr>
+          <a:xfrm>
+            <a:off x="10953173" y="612020"/>
+            <a:ext cx="7402638" cy="1751768"/>
+          </a:xfrm>
+          <a:prstGeom prst="flowChartAlternateProcess">
+            <a:avLst/>
+          </a:prstGeom>
+          <a:solidFill>
+            <a:srgbClr val="66C2A4">
+              <a:alpha val="45000"/>
+            </a:srgbClr>
+          </a:solidFill>
+          <a:ln>
+            <a:noFill/>
+          </a:ln>
+        </p:spPr>
+        <p:style>
+          <a:lnRef idx="2">
+            <a:schemeClr val="accent1">
+              <a:shade val="50000"/>
+            </a:schemeClr>
+          </a:lnRef>
+          <a:fillRef idx="1">
+            <a:schemeClr val="accent1"/>
+          </a:fillRef>
+          <a:effectRef idx="0">
+            <a:schemeClr val="accent1"/>
+          </a:effectRef>
+          <a:fontRef idx="minor">
+            <a:schemeClr val="lt1"/>
+          </a:fontRef>
+        </p:style>
+        <p:txBody>
+          <a:bodyPr rtlCol="0" anchor="t"/>
+          <a:lstStyle/>
+          <a:p>
+            <a:pPr algn="ctr"/>
+            <a:r>
+              <a:rPr lang="en-US" sz="4800" dirty="0" smtClean="0">
+                <a:solidFill>
+                  <a:srgbClr val="238B45"/>
+                </a:solidFill>
+              </a:rPr>
+              <a:t>Length distribution of MetaTracts in fiber bundle 1</a:t>
+            </a:r>
+            <a:endParaRPr lang="en-US" sz="4800" dirty="0">
+              <a:solidFill>
+                <a:srgbClr val="238B45"/>
+              </a:solidFill>
+            </a:endParaRPr>
+          </a:p>
+        </p:txBody>
+      </p:sp>
+      <p:sp>
+        <p:nvSpPr>
+          <p:cNvPr id="45" name="Teardrop 44"/>
+          <p:cNvSpPr>
+            <a:spLocks noChangeAspect="1"/>
+          </p:cNvSpPr>
+          <p:nvPr/>
+        </p:nvSpPr>
+        <p:spPr>
+          <a:xfrm rot="5400000">
+            <a:off x="10399608" y="-22916"/>
+            <a:ext cx="1114016" cy="1159847"/>
+          </a:xfrm>
+          <a:prstGeom prst="teardrop">
+            <a:avLst/>
+          </a:prstGeom>
+          <a:solidFill>
+            <a:srgbClr val="238B45"/>
+          </a:solidFill>
+          <a:ln>
+            <a:solidFill>
+              <a:schemeClr val="accent1">
+                <a:shade val="50000"/>
+                <a:alpha val="19000"/>
+              </a:schemeClr>
+            </a:solidFill>
+          </a:ln>
+        </p:spPr>
+        <p:style>
+          <a:lnRef idx="2">
+            <a:schemeClr val="accent1">
+              <a:shade val="50000"/>
+            </a:schemeClr>
+          </a:lnRef>
+          <a:fillRef idx="1">
+            <a:schemeClr val="accent1"/>
+          </a:fillRef>
+          <a:effectRef idx="0">
+            <a:schemeClr val="accent1"/>
+          </a:effectRef>
+          <a:fontRef idx="minor">
+            <a:schemeClr val="lt1"/>
+          </a:fontRef>
+        </p:style>
+        <p:txBody>
+          <a:bodyPr vert="vert270" rtlCol="0" anchor="ctr"/>
+          <a:lstStyle/>
+          <a:p>
+            <a:pPr algn="ctr"/>
+            <a:r>
+              <a:rPr lang="en-US" sz="9600" dirty="0"/>
+              <a:t>B</a:t>
+            </a:r>
+          </a:p>
+        </p:txBody>
+      </p:sp>
+      <p:sp>
+        <p:nvSpPr>
+          <p:cNvPr id="46" name="Teardrop 45"/>
+          <p:cNvSpPr>
+            <a:spLocks noChangeAspect="1"/>
+          </p:cNvSpPr>
+          <p:nvPr/>
+        </p:nvSpPr>
+        <p:spPr>
+          <a:xfrm rot="5400000">
+            <a:off x="22916" y="-22916"/>
+            <a:ext cx="1114016" cy="1159847"/>
+          </a:xfrm>
+          <a:prstGeom prst="teardrop">
+            <a:avLst/>
+          </a:prstGeom>
+          <a:solidFill>
+            <a:srgbClr val="238B45"/>
+          </a:solidFill>
+          <a:ln>
+            <a:solidFill>
+              <a:schemeClr val="accent1">
+                <a:shade val="50000"/>
+                <a:alpha val="19000"/>
+              </a:schemeClr>
+            </a:solidFill>
+          </a:ln>
+        </p:spPr>
+        <p:style>
+          <a:lnRef idx="2">
+            <a:schemeClr val="accent1">
+              <a:shade val="50000"/>
+            </a:schemeClr>
+          </a:lnRef>
+          <a:fillRef idx="1">
+            <a:schemeClr val="accent1"/>
+          </a:fillRef>
+          <a:effectRef idx="0">
+            <a:schemeClr val="accent1"/>
+          </a:effectRef>
+          <a:fontRef idx="minor">
+            <a:schemeClr val="lt1"/>
+          </a:fontRef>
+        </p:style>
+        <p:txBody>
+          <a:bodyPr vert="vert270" rtlCol="0" anchor="ctr"/>
+          <a:lstStyle/>
+          <a:p>
+            <a:pPr algn="ctr"/>
+            <a:r>
+              <a:rPr lang="en-US" sz="9600" dirty="0" smtClean="0"/>
+              <a:t>A</a:t>
+            </a:r>
+            <a:endParaRPr lang="en-US" sz="9600" dirty="0"/>
+          </a:p>
+        </p:txBody>
+      </p:sp>
+      <p:cxnSp>
+        <p:nvCxnSpPr>
+          <p:cNvPr id="3" name="Straight Connector 2"/>
+          <p:cNvCxnSpPr/>
+          <p:nvPr/>
+        </p:nvCxnSpPr>
+        <p:spPr>
+          <a:xfrm>
+            <a:off x="10104437" y="612020"/>
+            <a:ext cx="0" cy="11960434"/>
+          </a:xfrm>
+          <a:prstGeom prst="line">
+            <a:avLst/>
+          </a:prstGeom>
+          <a:ln w="142875" cap="rnd">
+            <a:solidFill>
+              <a:srgbClr val="238B45">
+                <a:alpha val="85000"/>
+              </a:srgbClr>
+            </a:solidFill>
+            <a:prstDash val="sysDot"/>
+          </a:ln>
+        </p:spPr>
+        <p:style>
+          <a:lnRef idx="1">
+            <a:schemeClr val="accent1"/>
+          </a:lnRef>
+          <a:fillRef idx="0">
+            <a:schemeClr val="accent1"/>
+          </a:fillRef>
+          <a:effectRef idx="0">
+            <a:schemeClr val="accent1"/>
+          </a:effectRef>
+          <a:fontRef idx="minor">
+            <a:schemeClr val="tx1"/>
+          </a:fontRef>
+        </p:style>
+      </p:cxnSp>
+      <p:pic>
+        <p:nvPicPr>
+          <p:cNvPr id="2" name="Picture 1"/>
+          <p:cNvPicPr>
+            <a:picLocks noChangeAspect="1"/>
+          </p:cNvPicPr>
+          <p:nvPr/>
+        </p:nvPicPr>
+        <p:blipFill rotWithShape="1">
+          <a:blip r:embed="rId7">
+            <a:extLst>
+              <a:ext uri="{28A0092B-C50C-407E-A947-70E740481C1C}">
+                <a14:useLocalDpi xmlns:a14="http://schemas.microsoft.com/office/drawing/2010/main" val="0"/>
+              </a:ext>
+            </a:extLst>
+          </a:blip>
+          <a:srcRect l="30567" r="30797"/>
+          <a:stretch/>
+        </p:blipFill>
+        <p:spPr>
+          <a:xfrm rot="5400000">
+            <a:off x="4615093" y="7423943"/>
+            <a:ext cx="3978457" cy="6322831"/>
+          </a:xfrm>
+          <a:prstGeom prst="rect">
+            <a:avLst/>
+          </a:prstGeom>
+          <a:ln w="107950">
+            <a:solidFill>
+              <a:srgbClr val="66C2A4"/>
+            </a:solidFill>
+          </a:ln>
+        </p:spPr>
+      </p:pic>
+      <p:grpSp>
+        <p:nvGrpSpPr>
+          <p:cNvPr id="24" name="Group 23"/>
+          <p:cNvGrpSpPr>
+            <a:grpSpLocks noChangeAspect="1"/>
+          </p:cNvGrpSpPr>
+          <p:nvPr/>
+        </p:nvGrpSpPr>
+        <p:grpSpPr>
+          <a:xfrm>
+            <a:off x="1612711" y="2119185"/>
+            <a:ext cx="2780379" cy="6210358"/>
+            <a:chOff x="3477317" y="896181"/>
+            <a:chExt cx="3383004" cy="7556402"/>
+          </a:xfrm>
+        </p:grpSpPr>
+        <p:cxnSp>
+          <p:nvCxnSpPr>
+            <p:cNvPr id="25" name="Straight Connector 24"/>
+            <p:cNvCxnSpPr/>
+            <p:nvPr/>
+          </p:nvCxnSpPr>
+          <p:spPr>
+            <a:xfrm flipV="1">
+              <a:off x="3519755" y="896181"/>
+              <a:ext cx="3328200" cy="4564373"/>
+            </a:xfrm>
+            <a:prstGeom prst="line">
+              <a:avLst/>
+            </a:prstGeom>
+            <a:ln w="127000" cap="rnd">
+              <a:solidFill>
+                <a:srgbClr val="66C2A4"/>
+              </a:solidFill>
+              <a:round/>
+            </a:ln>
+          </p:spPr>
+          <p:style>
+            <a:lnRef idx="1">
+              <a:schemeClr val="accent1"/>
+            </a:lnRef>
+            <a:fillRef idx="0">
+              <a:schemeClr val="accent1"/>
+            </a:fillRef>
+            <a:effectRef idx="0">
+              <a:schemeClr val="accent1"/>
+            </a:effectRef>
+            <a:fontRef idx="minor">
+              <a:schemeClr val="tx1"/>
+            </a:fontRef>
+          </p:style>
+        </p:cxnSp>
+        <p:cxnSp>
+          <p:nvCxnSpPr>
+            <p:cNvPr id="42" name="Straight Connector 41"/>
+            <p:cNvCxnSpPr/>
+            <p:nvPr/>
+          </p:nvCxnSpPr>
+          <p:spPr>
+            <a:xfrm flipV="1">
+              <a:off x="3477317" y="5460554"/>
+              <a:ext cx="42438" cy="2992029"/>
+            </a:xfrm>
+            <a:prstGeom prst="line">
+              <a:avLst/>
+            </a:prstGeom>
+            <a:ln w="127000" cap="rnd">
+              <a:solidFill>
+                <a:srgbClr val="66C2A4"/>
+              </a:solidFill>
+              <a:round/>
+            </a:ln>
+          </p:spPr>
+          <p:style>
+            <a:lnRef idx="1">
+              <a:schemeClr val="accent1"/>
+            </a:lnRef>
+            <a:fillRef idx="0">
+              <a:schemeClr val="accent1"/>
+            </a:fillRef>
+            <a:effectRef idx="0">
+              <a:schemeClr val="accent1"/>
+            </a:effectRef>
+            <a:fontRef idx="minor">
+              <a:schemeClr val="tx1"/>
+            </a:fontRef>
+          </p:style>
+        </p:cxnSp>
+        <p:cxnSp>
+          <p:nvCxnSpPr>
+            <p:cNvPr id="47" name="Straight Connector 46"/>
+            <p:cNvCxnSpPr/>
+            <p:nvPr/>
+          </p:nvCxnSpPr>
+          <p:spPr>
+            <a:xfrm flipH="1" flipV="1">
+              <a:off x="6847955" y="896181"/>
+              <a:ext cx="12366" cy="585743"/>
+            </a:xfrm>
+            <a:prstGeom prst="line">
+              <a:avLst/>
+            </a:prstGeom>
+            <a:ln w="127000" cap="rnd">
+              <a:solidFill>
+                <a:srgbClr val="66C2A4"/>
+              </a:solidFill>
+              <a:round/>
+            </a:ln>
+          </p:spPr>
+          <p:style>
+            <a:lnRef idx="1">
+              <a:schemeClr val="accent1"/>
+            </a:lnRef>
+            <a:fillRef idx="0">
+              <a:schemeClr val="accent1"/>
+            </a:fillRef>
+            <a:effectRef idx="0">
+              <a:schemeClr val="accent1"/>
+            </a:effectRef>
+            <a:fontRef idx="minor">
+              <a:schemeClr val="tx1"/>
+            </a:fontRef>
+          </p:style>
+        </p:cxnSp>
+        <p:cxnSp>
+          <p:nvCxnSpPr>
+            <p:cNvPr id="48" name="Straight Connector 47"/>
+            <p:cNvCxnSpPr/>
+            <p:nvPr/>
+          </p:nvCxnSpPr>
+          <p:spPr>
+            <a:xfrm flipV="1">
+              <a:off x="3477317" y="7817615"/>
+              <a:ext cx="396840" cy="634968"/>
+            </a:xfrm>
+            <a:prstGeom prst="line">
+              <a:avLst/>
+            </a:prstGeom>
+            <a:ln w="127000" cap="rnd">
+              <a:solidFill>
+                <a:srgbClr val="66C2A4"/>
+              </a:solidFill>
+              <a:round/>
+            </a:ln>
+          </p:spPr>
+          <p:style>
+            <a:lnRef idx="1">
+              <a:schemeClr val="accent1"/>
+            </a:lnRef>
+            <a:fillRef idx="0">
+              <a:schemeClr val="accent1"/>
+            </a:fillRef>
+            <a:effectRef idx="0">
+              <a:schemeClr val="accent1"/>
+            </a:effectRef>
+            <a:fontRef idx="minor">
+              <a:schemeClr val="tx1"/>
+            </a:fontRef>
+          </p:style>
+        </p:cxnSp>
+      </p:grpSp>
+      <p:sp>
+        <p:nvSpPr>
+          <p:cNvPr id="49" name="TextBox 48"/>
+          <p:cNvSpPr txBox="1"/>
+          <p:nvPr/>
+        </p:nvSpPr>
+        <p:spPr>
+          <a:xfrm>
+            <a:off x="7372316" y="7653114"/>
+            <a:ext cx="2503445" cy="830997"/>
+          </a:xfrm>
+          <a:prstGeom prst="rect">
+            <a:avLst/>
+          </a:prstGeom>
+          <a:solidFill>
+            <a:srgbClr val="66C2A4"/>
+          </a:solidFill>
+          <a:effectLst>
+            <a:softEdge rad="63500"/>
+          </a:effectLst>
+        </p:spPr>
+        <p:txBody>
+          <a:bodyPr wrap="square" rtlCol="0">
+            <a:spAutoFit/>
+          </a:bodyPr>
+          <a:lstStyle/>
+          <a:p>
+            <a:r>
+              <a:rPr lang="en-US" sz="4800" dirty="0">
+                <a:solidFill>
+                  <a:schemeClr val="bg1"/>
+                </a:solidFill>
+              </a:rPr>
+              <a:t>Y Z Plane</a:t>
+            </a:r>
+          </a:p>
+        </p:txBody>
+      </p:sp>
+      <p:sp>
+        <p:nvSpPr>
+          <p:cNvPr id="4" name="Arc 3"/>
+          <p:cNvSpPr/>
+          <p:nvPr/>
+        </p:nvSpPr>
+        <p:spPr>
+          <a:xfrm rot="21173301">
+            <a:off x="743744" y="7514478"/>
+            <a:ext cx="2805525" cy="3558975"/>
+          </a:xfrm>
+          <a:prstGeom prst="arc">
+            <a:avLst>
+              <a:gd name="adj1" fmla="val 4095112"/>
+              <a:gd name="adj2" fmla="val 14891637"/>
+            </a:avLst>
+          </a:prstGeom>
+          <a:ln w="117475">
+            <a:solidFill>
+              <a:srgbClr val="238B45"/>
+            </a:solidFill>
+            <a:headEnd type="stealth"/>
+          </a:ln>
+        </p:spPr>
+        <p:style>
+          <a:lnRef idx="1">
+            <a:schemeClr val="accent1"/>
+          </a:lnRef>
+          <a:fillRef idx="0">
+            <a:schemeClr val="accent1"/>
+          </a:fillRef>
+          <a:effectRef idx="0">
+            <a:schemeClr val="accent1"/>
+          </a:effectRef>
+          <a:fontRef idx="minor">
+            <a:schemeClr val="tx1"/>
+          </a:fontRef>
+        </p:style>
+        <p:txBody>
+          <a:bodyPr rtlCol="0" anchor="ctr"/>
+          <a:lstStyle/>
+          <a:p>
+            <a:pPr algn="ctr"/>
+            <a:endParaRPr lang="en-US"/>
+          </a:p>
+        </p:txBody>
+      </p:sp>
+    </p:spTree>
+    <p:extLst>
+      <p:ext uri="{BB962C8B-B14F-4D97-AF65-F5344CB8AC3E}">
+        <p14:creationId xmlns:p14="http://schemas.microsoft.com/office/powerpoint/2010/main" val="3391538174"/>
       </p:ext>
     </p:extLst>
   </p:cSld>

</xml_diff>